<commit_message>
Added synthetic data fitting. Fixed bug which caused small uncertainties, was accidentally fitting to smoothed data.
</commit_message>
<xml_diff>
--- a/nickfits/scan3_peaks.pptx
+++ b/nickfits/scan3_peaks.pptx
@@ -5,7 +5,7 @@
     <p:sldMasterId id="2147483648" r:id="rId1"/>
   </p:sldMasterIdLst>
   <p:sldIdLst>
-    <p:sldId id="257" r:id="rId2"/>
+    <p:sldId id="256" r:id="rId2"/>
   </p:sldIdLst>
   <p:sldSz cx="12192000" cy="6858000"/>
   <p:notesSz cx="6858000" cy="9144000"/>
@@ -3387,7 +3387,7 @@
           <a:p>
             <a:r>
               <a:rPr lang="en-US" sz="1400" dirty="0"/>
-              <a:t>17323.47651(4)</a:t>
+              <a:t>17323.64748(4)</a:t>
             </a:r>
           </a:p>
         </p:txBody>
@@ -3422,7 +3422,7 @@
           <a:p>
             <a:r>
               <a:rPr lang="en-US" sz="1400" dirty="0"/>
-              <a:t>17323.4832(1)</a:t>
+              <a:t>17323.6542(1)</a:t>
             </a:r>
           </a:p>
         </p:txBody>
@@ -3457,7 +3457,7 @@
           <a:p>
             <a:r>
               <a:rPr lang="en-US" sz="1400" dirty="0"/>
-              <a:t>17323.4884(5)</a:t>
+              <a:t>17323.6594(5)</a:t>
             </a:r>
           </a:p>
         </p:txBody>
@@ -3492,7 +3492,7 @@
           <a:p>
             <a:r>
               <a:rPr lang="en-US" sz="1400" dirty="0"/>
-              <a:t>17323.49177(8)</a:t>
+              <a:t>17323.66273(8)</a:t>
             </a:r>
           </a:p>
         </p:txBody>
@@ -3527,7 +3527,7 @@
           <a:p>
             <a:r>
               <a:rPr lang="en-US" sz="1400" dirty="0"/>
-              <a:t>17323.4954(3)</a:t>
+              <a:t>17323.6663(3)</a:t>
             </a:r>
           </a:p>
         </p:txBody>
@@ -3562,7 +3562,7 @@
           <a:p>
             <a:r>
               <a:rPr lang="en-US" sz="1400" dirty="0"/>
-              <a:t>17323.50030(8)</a:t>
+              <a:t>17323.67126(8)</a:t>
             </a:r>
           </a:p>
         </p:txBody>
@@ -3597,7 +3597,7 @@
           <a:p>
             <a:r>
               <a:rPr lang="en-US" sz="1400" dirty="0"/>
-              <a:t>17323.50640(7)</a:t>
+              <a:t>17323.67736(7)</a:t>
             </a:r>
           </a:p>
         </p:txBody>
@@ -3632,7 +3632,7 @@
           <a:p>
             <a:r>
               <a:rPr lang="en-US" sz="1400" dirty="0"/>
-              <a:t>17323.51018(7)</a:t>
+              <a:t>17323.68114(7)</a:t>
             </a:r>
           </a:p>
         </p:txBody>
@@ -3667,7 +3667,7 @@
           <a:p>
             <a:r>
               <a:rPr lang="en-US" sz="1400" dirty="0"/>
-              <a:t>17323.5352(2)</a:t>
+              <a:t>17323.7062(2)</a:t>
             </a:r>
           </a:p>
         </p:txBody>
@@ -3702,7 +3702,7 @@
           <a:p>
             <a:r>
               <a:rPr lang="en-US" sz="1400" dirty="0"/>
-              <a:t>17323.53747(5)</a:t>
+              <a:t>17323.70844(5)</a:t>
             </a:r>
           </a:p>
         </p:txBody>
@@ -3737,7 +3737,7 @@
           <a:p>
             <a:r>
               <a:rPr lang="en-US" sz="1400" dirty="0"/>
-              <a:t>17323.54029(9)</a:t>
+              <a:t>17323.71125(9)</a:t>
             </a:r>
           </a:p>
         </p:txBody>
@@ -3772,7 +3772,7 @@
           <a:p>
             <a:r>
               <a:rPr lang="en-US" sz="1400" dirty="0"/>
-              <a:t>17323.5459(2)</a:t>
+              <a:t>17323.7168(2)</a:t>
             </a:r>
           </a:p>
         </p:txBody>
@@ -3807,7 +3807,7 @@
           <a:p>
             <a:r>
               <a:rPr lang="en-US" sz="1400" dirty="0"/>
-              <a:t>17323.5549(2)</a:t>
+              <a:t>17323.7258(2)</a:t>
             </a:r>
           </a:p>
         </p:txBody>
@@ -3842,7 +3842,7 @@
           <a:p>
             <a:r>
               <a:rPr lang="en-US" sz="1400" dirty="0"/>
-              <a:t>17323.5591(1)</a:t>
+              <a:t>17323.7301(1)</a:t>
             </a:r>
           </a:p>
         </p:txBody>
@@ -3877,7 +3877,7 @@
           <a:p>
             <a:r>
               <a:rPr lang="en-US" sz="1400" dirty="0"/>
-              <a:t>17323.5641(1)</a:t>
+              <a:t>17323.7350(1)</a:t>
             </a:r>
           </a:p>
         </p:txBody>
@@ -3912,7 +3912,7 @@
           <a:p>
             <a:r>
               <a:rPr lang="en-US" sz="1400" dirty="0"/>
-              <a:t>17323.5755(1)</a:t>
+              <a:t>17323.7464(1)</a:t>
             </a:r>
           </a:p>
         </p:txBody>
@@ -3920,7 +3920,7 @@
     </p:spTree>
     <p:extLst>
       <p:ext uri="{BB962C8B-B14F-4D97-AF65-F5344CB8AC3E}">
-        <p14:creationId xmlns:p14="http://schemas.microsoft.com/office/powerpoint/2010/main" val="3019693419"/>
+        <p14:creationId xmlns:p14="http://schemas.microsoft.com/office/powerpoint/2010/main" val="2883886127"/>
       </p:ext>
     </p:extLst>
   </p:cSld>

</xml_diff>